<commit_message>
update presentation and bump to .NET9
</commit_message>
<xml_diff>
--- a/slides/presentation.pptx
+++ b/slides/presentation.pptx
@@ -11,7 +11,7 @@
     <p:handoutMasterId r:id="rId26"/>
   </p:handoutMasterIdLst>
   <p:sldIdLst>
-    <p:sldId id="257" r:id="rId4"/>
+    <p:sldId id="287" r:id="rId4"/>
     <p:sldId id="283" r:id="rId5"/>
     <p:sldId id="284" r:id="rId6"/>
     <p:sldId id="261" r:id="rId7"/>
@@ -278,7 +278,7 @@
           <a:p>
             <a:fld id="{37581487-DED7-4908-9A01-0A45EDCB1D6C}" type="datetimeFigureOut">
               <a:rPr lang="de-DE" sz="1100"/>
-              <a:t>22.11.2024</a:t>
+              <a:t>03.02.2025</a:t>
             </a:fld>
             <a:endParaRPr lang="de-DE" sz="1100"/>
           </a:p>
@@ -673,7 +673,7 @@
       </p:grpSpPr>
       <p:sp>
         <p:nvSpPr>
-          <p:cNvPr id="3" name="Folienbildplatzhalter 2"/>
+          <p:cNvPr id="2" name="Slide Image Placeholder 1"/>
           <p:cNvSpPr>
             <a:spLocks noGrp="1" noRot="1" noChangeAspect="1"/>
           </p:cNvSpPr>
@@ -681,19 +681,11 @@
             <p:ph type="sldImg"/>
           </p:nvPr>
         </p:nvSpPr>
-        <p:spPr>
-          <a:xfrm>
-            <a:off x="349250" y="346075"/>
-            <a:ext cx="5908675" cy="3324225"/>
-          </a:xfrm>
-          <a:prstGeom prst="rect">
-            <a:avLst/>
-          </a:prstGeom>
-        </p:spPr>
-      </p:sp>
-      <p:sp>
-        <p:nvSpPr>
-          <p:cNvPr id="5" name="Notizenplatzhalter 4"/>
+        <p:spPr/>
+      </p:sp>
+      <p:sp>
+        <p:nvSpPr>
+          <p:cNvPr id="3" name="Notes Placeholder 2"/>
           <p:cNvSpPr>
             <a:spLocks noGrp="1"/>
           </p:cNvSpPr>
@@ -701,206 +693,45 @@
             <p:ph type="body" idx="1"/>
           </p:nvPr>
         </p:nvSpPr>
-        <p:spPr>
-          <a:xfrm>
-            <a:off x="360001" y="4276251"/>
-            <a:ext cx="6120000" cy="5248125"/>
-          </a:xfrm>
-          <a:prstGeom prst="rect">
-            <a:avLst/>
-          </a:prstGeom>
-        </p:spPr>
-        <p:txBody>
-          <a:bodyPr/>
-          <a:lstStyle/>
-          <a:p>
-            <a:r>
-              <a:rPr lang="de-DE" dirty="0"/>
-              <a:t>Hi all, nice </a:t>
-            </a:r>
-            <a:r>
-              <a:rPr lang="de-DE" dirty="0" err="1"/>
-              <a:t>to</a:t>
-            </a:r>
-            <a:r>
-              <a:rPr lang="de-DE" dirty="0"/>
-              <a:t> </a:t>
-            </a:r>
-            <a:r>
-              <a:rPr lang="de-DE" dirty="0" err="1"/>
-              <a:t>see</a:t>
-            </a:r>
-            <a:r>
-              <a:rPr lang="de-DE" dirty="0"/>
-              <a:t> </a:t>
-            </a:r>
-            <a:r>
-              <a:rPr lang="de-DE" dirty="0" err="1"/>
-              <a:t>you</a:t>
-            </a:r>
-            <a:r>
-              <a:rPr lang="de-DE" dirty="0"/>
-              <a:t> </a:t>
-            </a:r>
-            <a:r>
-              <a:rPr lang="de-DE" dirty="0" err="1"/>
-              <a:t>coming</a:t>
-            </a:r>
-            <a:r>
-              <a:rPr lang="de-DE" dirty="0"/>
-              <a:t> </a:t>
-            </a:r>
-            <a:r>
-              <a:rPr lang="de-DE" dirty="0" err="1"/>
-              <a:t>up</a:t>
-            </a:r>
-            <a:r>
-              <a:rPr lang="de-DE" dirty="0"/>
-              <a:t> </a:t>
-            </a:r>
-            <a:r>
-              <a:rPr lang="de-DE" dirty="0" err="1"/>
-              <a:t>for</a:t>
-            </a:r>
-            <a:r>
-              <a:rPr lang="de-DE" dirty="0"/>
-              <a:t> </a:t>
-            </a:r>
-            <a:r>
-              <a:rPr lang="de-DE" dirty="0" err="1"/>
-              <a:t>this</a:t>
-            </a:r>
-            <a:r>
-              <a:rPr lang="de-DE" dirty="0"/>
-              <a:t> </a:t>
-            </a:r>
-            <a:r>
-              <a:rPr lang="de-DE" dirty="0" err="1"/>
-              <a:t>session</a:t>
-            </a:r>
-            <a:r>
-              <a:rPr lang="de-DE" dirty="0"/>
-              <a:t> </a:t>
-            </a:r>
-            <a:r>
-              <a:rPr lang="de-DE" dirty="0" err="1"/>
-              <a:t>about</a:t>
-            </a:r>
-            <a:r>
-              <a:rPr lang="de-DE" dirty="0"/>
-              <a:t> </a:t>
-            </a:r>
-            <a:r>
-              <a:rPr lang="de-DE" dirty="0" err="1"/>
-              <a:t>saying</a:t>
-            </a:r>
-            <a:r>
-              <a:rPr lang="de-DE" dirty="0"/>
-              <a:t> goodbye </a:t>
-            </a:r>
-            <a:r>
-              <a:rPr lang="de-DE" dirty="0" err="1"/>
-              <a:t>to</a:t>
-            </a:r>
-            <a:r>
-              <a:rPr lang="de-DE" dirty="0"/>
-              <a:t> </a:t>
-            </a:r>
-            <a:r>
-              <a:rPr lang="de-DE" dirty="0" err="1"/>
-              <a:t>IConfigurations</a:t>
-            </a:r>
-            <a:r>
-              <a:rPr lang="de-DE" dirty="0"/>
-              <a:t> and </a:t>
-            </a:r>
-            <a:r>
-              <a:rPr lang="de-DE" dirty="0" err="1"/>
-              <a:t>embrace</a:t>
-            </a:r>
-            <a:r>
-              <a:rPr lang="de-DE" dirty="0"/>
-              <a:t> </a:t>
-            </a:r>
-            <a:r>
-              <a:rPr lang="de-DE" dirty="0" err="1"/>
-              <a:t>the</a:t>
-            </a:r>
-            <a:r>
-              <a:rPr lang="de-DE" dirty="0"/>
-              <a:t> power </a:t>
-            </a:r>
-            <a:r>
-              <a:rPr lang="de-DE" dirty="0" err="1"/>
-              <a:t>of</a:t>
-            </a:r>
-            <a:r>
-              <a:rPr lang="de-DE" dirty="0"/>
-              <a:t> </a:t>
-            </a:r>
-            <a:r>
-              <a:rPr lang="de-DE" dirty="0" err="1"/>
-              <a:t>the</a:t>
-            </a:r>
-            <a:r>
-              <a:rPr lang="de-DE" dirty="0"/>
-              <a:t> </a:t>
-            </a:r>
-            <a:r>
-              <a:rPr lang="de-DE" dirty="0" err="1"/>
-              <a:t>IOptions</a:t>
-            </a:r>
-            <a:r>
-              <a:rPr lang="de-DE" dirty="0"/>
-              <a:t> </a:t>
-            </a:r>
-            <a:r>
-              <a:rPr lang="de-DE" dirty="0" err="1"/>
-              <a:t>pattern</a:t>
-            </a:r>
-            <a:r>
-              <a:rPr lang="de-DE" dirty="0"/>
-              <a:t>.</a:t>
-            </a:r>
-          </a:p>
-        </p:txBody>
-      </p:sp>
-      <p:sp>
-        <p:nvSpPr>
-          <p:cNvPr id="2" name="Foliennummernplatzhalter 1"/>
-          <p:cNvSpPr>
-            <a:spLocks noGrp="1"/>
-          </p:cNvSpPr>
-          <p:nvPr>
-            <p:ph type="sldNum" sz="quarter" idx="10"/>
-          </p:nvPr>
-        </p:nvSpPr>
-        <p:spPr>
-          <a:xfrm>
-            <a:off x="3884614" y="9597289"/>
-            <a:ext cx="2971800" cy="272125"/>
-          </a:xfrm>
-          <a:prstGeom prst="rect">
-            <a:avLst/>
-          </a:prstGeom>
-        </p:spPr>
-        <p:txBody>
-          <a:bodyPr/>
-          <a:lstStyle/>
-          <a:p>
-            <a:fld id="{D61B4C21-2AF8-4513-9A88-12DEBB551087}" type="slidenum">
-              <a:rPr lang="de-DE" smtClean="0"/>
-              <a:pPr/>
+        <p:spPr/>
+        <p:txBody>
+          <a:bodyPr/>
+          <a:lstStyle/>
+          <a:p>
+            <a:r>
+              <a:rPr lang="nl-BE" dirty="0"/>
+              <a:t>Hi all, nice to see you coming up for this session about saying goodbye to IConfiguration and embracthe the power of the Ioptions pattern.</a:t>
+            </a:r>
+          </a:p>
+        </p:txBody>
+      </p:sp>
+      <p:sp>
+        <p:nvSpPr>
+          <p:cNvPr id="4" name="Slide Number Placeholder 3"/>
+          <p:cNvSpPr>
+            <a:spLocks noGrp="1"/>
+          </p:cNvSpPr>
+          <p:nvPr>
+            <p:ph type="sldNum" sz="quarter" idx="5"/>
+          </p:nvPr>
+        </p:nvSpPr>
+        <p:spPr/>
+        <p:txBody>
+          <a:bodyPr/>
+          <a:lstStyle/>
+          <a:p>
+            <a:fld id="{F2CAA8BB-88FD-437C-AAF8-B4CF0C75ED63}" type="slidenum">
+              <a:rPr lang="nl-BE" smtClean="0"/>
               <a:t>1</a:t>
             </a:fld>
-            <a:endParaRPr lang="de-DE" dirty="0"/>
+            <a:endParaRPr lang="nl-BE"/>
           </a:p>
         </p:txBody>
       </p:sp>
     </p:spTree>
     <p:extLst>
       <p:ext uri="{BB962C8B-B14F-4D97-AF65-F5344CB8AC3E}">
-        <p14:creationId xmlns:p14="http://schemas.microsoft.com/office/powerpoint/2010/main" val="1291651397"/>
+        <p14:creationId xmlns:p14="http://schemas.microsoft.com/office/powerpoint/2010/main" val="3370172376"/>
       </p:ext>
     </p:extLst>
   </p:cSld>
@@ -14190,7 +14021,7 @@
 
 <file path=ppt/slides/slide1.xml><?xml version="1.0" encoding="utf-8"?>
 <p:sld xmlns:a="http://schemas.openxmlformats.org/drawingml/2006/main" xmlns:r="http://schemas.openxmlformats.org/officeDocument/2006/relationships" xmlns:p="http://schemas.openxmlformats.org/presentationml/2006/main">
-  <p:cSld name="v_1615">
+  <p:cSld>
     <p:spTree>
       <p:nvGrpSpPr>
         <p:cNvPr id="1" name=""/>
@@ -14207,47 +14038,120 @@
       </p:grpSpPr>
       <p:pic>
         <p:nvPicPr>
-          <p:cNvPr id="7" name="Picture 6" descr="A purple card with text and a picture of a person">
+          <p:cNvPr id="7" name="Picture Placeholder 6" descr="A person standing in front of a group of people">
             <a:extLst>
               <a:ext uri="{FF2B5EF4-FFF2-40B4-BE49-F238E27FC236}">
-                <a16:creationId xmlns:a16="http://schemas.microsoft.com/office/drawing/2014/main" id="{1FB82FF1-8168-C0BE-DBFE-283A5472A554}"/>
+                <a16:creationId xmlns:a16="http://schemas.microsoft.com/office/drawing/2014/main" id="{92B06A54-C12A-7A8F-1ABD-EDEA3B1B0271}"/>
               </a:ext>
             </a:extLst>
           </p:cNvPr>
           <p:cNvPicPr>
-            <a:picLocks noChangeAspect="1"/>
+            <a:picLocks noGrp="1" noChangeAspect="1"/>
           </p:cNvPicPr>
-          <p:nvPr/>
+          <p:nvPr>
+            <p:ph type="pic" sz="quarter" idx="12"/>
+          </p:nvPr>
         </p:nvPicPr>
         <p:blipFill>
-          <a:blip r:embed="rId4">
+          <a:blip r:embed="rId3">
             <a:extLst>
               <a:ext uri="{28A0092B-C50C-407E-A947-70E740481C1C}">
                 <a14:useLocalDpi xmlns:a14="http://schemas.microsoft.com/office/drawing/2010/main" val="0"/>
               </a:ext>
             </a:extLst>
           </a:blip>
+          <a:srcRect t="7799" b="7799"/>
           <a:stretch>
             <a:fillRect/>
           </a:stretch>
         </p:blipFill>
-        <p:spPr>
-          <a:xfrm>
-            <a:off x="0" y="0"/>
-            <a:ext cx="9144000" cy="5143500"/>
-          </a:xfrm>
-          <a:prstGeom prst="rect">
-            <a:avLst/>
-          </a:prstGeom>
-        </p:spPr>
+        <p:spPr/>
       </p:pic>
+      <p:sp>
+        <p:nvSpPr>
+          <p:cNvPr id="3" name="Title 2">
+            <a:extLst>
+              <a:ext uri="{FF2B5EF4-FFF2-40B4-BE49-F238E27FC236}">
+                <a16:creationId xmlns:a16="http://schemas.microsoft.com/office/drawing/2014/main" id="{808A5082-0613-9E70-4D5C-BA7773350FBA}"/>
+              </a:ext>
+            </a:extLst>
+          </p:cNvPr>
+          <p:cNvSpPr>
+            <a:spLocks noGrp="1"/>
+          </p:cNvSpPr>
+          <p:nvPr>
+            <p:ph type="ctrTitle"/>
+          </p:nvPr>
+        </p:nvSpPr>
+        <p:spPr/>
+        <p:txBody>
+          <a:bodyPr/>
+          <a:lstStyle/>
+          <a:p>
+            <a:r>
+              <a:rPr lang="nl-BE" dirty="0"/>
+              <a:t>Say goodbye to IConfiguration and embrace the power of the IOptions pattern</a:t>
+            </a:r>
+          </a:p>
+        </p:txBody>
+      </p:sp>
+      <p:sp>
+        <p:nvSpPr>
+          <p:cNvPr id="4" name="Subtitle 3">
+            <a:extLst>
+              <a:ext uri="{FF2B5EF4-FFF2-40B4-BE49-F238E27FC236}">
+                <a16:creationId xmlns:a16="http://schemas.microsoft.com/office/drawing/2014/main" id="{60020598-D33B-6193-CA7D-8E401B532F9D}"/>
+              </a:ext>
+            </a:extLst>
+          </p:cNvPr>
+          <p:cNvSpPr>
+            <a:spLocks noGrp="1"/>
+          </p:cNvSpPr>
+          <p:nvPr>
+            <p:ph type="subTitle" idx="1"/>
+          </p:nvPr>
+        </p:nvSpPr>
+        <p:spPr/>
+        <p:txBody>
+          <a:bodyPr/>
+          <a:lstStyle/>
+          <a:p>
+            <a:r>
+              <a:rPr lang="nl-BE" dirty="0"/>
+              <a:t>Pieter Samyn</a:t>
+            </a:r>
+          </a:p>
+        </p:txBody>
+      </p:sp>
+      <p:sp>
+        <p:nvSpPr>
+          <p:cNvPr id="5" name="Picture Placeholder 4">
+            <a:extLst>
+              <a:ext uri="{FF2B5EF4-FFF2-40B4-BE49-F238E27FC236}">
+                <a16:creationId xmlns:a16="http://schemas.microsoft.com/office/drawing/2014/main" id="{4041F546-9384-7F21-526E-31DA04F382C5}"/>
+              </a:ext>
+            </a:extLst>
+          </p:cNvPr>
+          <p:cNvSpPr>
+            <a:spLocks noGrp="1"/>
+          </p:cNvSpPr>
+          <p:nvPr>
+            <p:ph type="pic" sz="quarter" idx="13"/>
+          </p:nvPr>
+        </p:nvSpPr>
+        <p:spPr/>
+        <p:txBody>
+          <a:bodyPr/>
+          <a:lstStyle/>
+          <a:p>
+            <a:endParaRPr lang="nl-BE"/>
+          </a:p>
+        </p:txBody>
+      </p:sp>
     </p:spTree>
-    <p:custDataLst>
-      <p:tags r:id="rId1"/>
-    </p:custDataLst>
     <p:extLst>
       <p:ext uri="{BB962C8B-B14F-4D97-AF65-F5344CB8AC3E}">
-        <p14:creationId xmlns:p14="http://schemas.microsoft.com/office/powerpoint/2010/main" val="1800626840"/>
+        <p14:creationId xmlns:p14="http://schemas.microsoft.com/office/powerpoint/2010/main" val="700333554"/>
       </p:ext>
     </p:extLst>
   </p:cSld>
@@ -18627,13 +18531,6 @@
   <p:tag name="SLIDO_PRESENTATION_ID" val="00000000-0000-0000-0000-000000000000"/>
   <p:tag name="SLIDO_EVENT_UUID" val="0638bfdd-f174-49eb-957e-8b0e1a6745a2"/>
   <p:tag name="SLIDO_EVENT_SECTION_UUID" val="e5d91fc0-4a58-4803-8c35-c2ea8e1d3ee2"/>
-</p:tagLst>
-</file>
-
-<file path=ppt/tags/tag2.xml><?xml version="1.0" encoding="utf-8"?>
-<p:tagLst xmlns:a="http://schemas.openxmlformats.org/drawingml/2006/main" xmlns:r="http://schemas.openxmlformats.org/officeDocument/2006/relationships" xmlns:p="http://schemas.openxmlformats.org/presentationml/2006/main">
-  <p:tag name="TWNOCDCHECK" val="-1"/>
-  <p:tag name="SLIDENAME" val="v_1615"/>
 </p:tagLst>
 </file>
 
@@ -19498,6 +19395,15 @@
 </file>
 
 <file path=customXml/item1.xml><?xml version="1.0" encoding="utf-8"?>
+<?mso-contentType ?>
+<FormTemplates xmlns="http://schemas.microsoft.com/sharepoint/v3/contenttype/forms">
+  <Display>DocumentLibraryForm</Display>
+  <Edit>DocumentLibraryForm</Edit>
+  <New>DocumentLibraryForm</New>
+</FormTemplates>
+</file>
+
+<file path=customXml/item2.xml><?xml version="1.0" encoding="utf-8"?>
 <ct:contentTypeSchema xmlns:ct="http://schemas.microsoft.com/office/2006/metadata/contentType" xmlns:ma="http://schemas.microsoft.com/office/2006/metadata/properties/metaAttributes" ct:_="" ma:_="" ma:contentTypeName="Dokument" ma:contentTypeID="0x01010050460AE39A82AD4795A3565F3DAE5EA8" ma:contentTypeVersion="16" ma:contentTypeDescription="Ein neues Dokument erstellen." ma:contentTypeScope="" ma:versionID="ec82a9993c9b8a2201503eb30937bf4a">
   <xsd:schema xmlns:xsd="http://www.w3.org/2001/XMLSchema" xmlns:xs="http://www.w3.org/2001/XMLSchema" xmlns:p="http://schemas.microsoft.com/office/2006/metadata/properties" xmlns:ns2="e05445a8-2551-4a63-879e-01155c2c761e" xmlns:ns3="01e95462-78a7-41d4-9a93-e8d8dde53743" targetNamespace="http://schemas.microsoft.com/office/2006/metadata/properties" ma:root="true" ma:fieldsID="0382105114aa7af2a0cdb49a7fd70252" ns2:_="" ns3:_="">
     <xsd:import namespace="e05445a8-2551-4a63-879e-01155c2c761e"/>
@@ -19740,16 +19646,15 @@
 </ct:contentTypeSchema>
 </file>
 
-<file path=customXml/item2.xml><?xml version="1.0" encoding="utf-8"?>
-<?mso-contentType ?>
-<FormTemplates xmlns="http://schemas.microsoft.com/sharepoint/v3/contenttype/forms">
-  <Display>DocumentLibraryForm</Display>
-  <Edit>DocumentLibraryForm</Edit>
-  <New>DocumentLibraryForm</New>
-</FormTemplates>
+<file path=customXml/itemProps1.xml><?xml version="1.0" encoding="utf-8"?>
+<ds:datastoreItem xmlns:ds="http://schemas.openxmlformats.org/officeDocument/2006/customXml" ds:itemID="{DDA0BA8E-434D-48CF-8C42-C96ADE6F01B2}">
+  <ds:schemaRefs>
+    <ds:schemaRef ds:uri="http://schemas.microsoft.com/sharepoint/v3/contenttype/forms"/>
+  </ds:schemaRefs>
+</ds:datastoreItem>
 </file>
 
-<file path=customXml/itemProps1.xml><?xml version="1.0" encoding="utf-8"?>
+<file path=customXml/itemProps2.xml><?xml version="1.0" encoding="utf-8"?>
 <ds:datastoreItem xmlns:ds="http://schemas.openxmlformats.org/officeDocument/2006/customXml" ds:itemID="{0BB5088A-3ACC-49D2-A58D-F09F6B8954CE}">
   <ds:schemaRefs>
     <ds:schemaRef ds:uri="http://schemas.microsoft.com/office/2006/metadata/contentType"/>
@@ -19766,12 +19671,4 @@
     <ds:schemaRef ds:uri="http://schemas.microsoft.com/internal/obd"/>
   </ds:schemaRefs>
 </ds:datastoreItem>
-</file>
-
-<file path=customXml/itemProps2.xml><?xml version="1.0" encoding="utf-8"?>
-<ds:datastoreItem xmlns:ds="http://schemas.openxmlformats.org/officeDocument/2006/customXml" ds:itemID="{DDA0BA8E-434D-48CF-8C42-C96ADE6F01B2}">
-  <ds:schemaRefs>
-    <ds:schemaRef ds:uri="http://schemas.microsoft.com/sharepoint/v3/contenttype/forms"/>
-  </ds:schemaRefs>
-</ds:datastoreItem>
 </file>
</xml_diff>

<commit_message>
Review presentation & code
</commit_message>
<xml_diff>
--- a/slides/presentation.pptx
+++ b/slides/presentation.pptx
@@ -5,10 +5,10 @@
     <p:sldMasterId id="2147483648" r:id="rId3"/>
   </p:sldMasterIdLst>
   <p:notesMasterIdLst>
-    <p:notesMasterId r:id="rId25"/>
+    <p:notesMasterId r:id="rId26"/>
   </p:notesMasterIdLst>
   <p:handoutMasterIdLst>
-    <p:handoutMasterId r:id="rId26"/>
+    <p:handoutMasterId r:id="rId27"/>
   </p:handoutMasterIdLst>
   <p:sldIdLst>
     <p:sldId id="287" r:id="rId4"/>
@@ -31,12 +31,13 @@
     <p:sldId id="277" r:id="rId21"/>
     <p:sldId id="278" r:id="rId22"/>
     <p:sldId id="285" r:id="rId23"/>
-    <p:sldId id="286" r:id="rId24"/>
+    <p:sldId id="288" r:id="rId24"/>
+    <p:sldId id="286" r:id="rId25"/>
   </p:sldIdLst>
   <p:sldSz cx="9144000" cy="5143500" type="screen16x9"/>
   <p:notesSz cx="6858000" cy="9874250"/>
   <p:custDataLst>
-    <p:tags r:id="rId27"/>
+    <p:tags r:id="rId28"/>
   </p:custDataLst>
   <p:defaultTextStyle>
     <a:defPPr>
@@ -278,7 +279,7 @@
           <a:p>
             <a:fld id="{37581487-DED7-4908-9A01-0A45EDCB1D6C}" type="datetimeFigureOut">
               <a:rPr lang="de-DE" sz="1100"/>
-              <a:t>03.02.2025</a:t>
+              <a:t>23.02.2025</a:t>
             </a:fld>
             <a:endParaRPr lang="de-DE" sz="1100"/>
           </a:p>
@@ -700,7 +701,7 @@
           <a:p>
             <a:r>
               <a:rPr lang="nl-BE" dirty="0"/>
-              <a:t>Hi all, nice to see you coming up for this session about saying goodbye to IConfiguration and embracthe the power of the Ioptions pattern.</a:t>
+              <a:t>Hi all, nice to see you joinig for this session about saying goodbye to IConfiguration and embrace the power of the IOptions pattern.</a:t>
             </a:r>
           </a:p>
         </p:txBody>
@@ -2370,21 +2371,6 @@
           <a:bodyPr/>
           <a:lstStyle/>
           <a:p>
-            <a:r>
-              <a:rPr lang="en-US" sz="800" b="1" dirty="0"/>
-              <a:t>Are there people still using .NET6 or .NET7?</a:t>
-            </a:r>
-          </a:p>
-          <a:p>
-            <a:r>
-              <a:rPr lang="en-US" sz="800" dirty="0"/>
-              <a:t>This demo will depend on the .NET8 syntax, you will see why I didn’t consider the previous versions.</a:t>
-            </a:r>
-          </a:p>
-          <a:p>
-            <a:endParaRPr lang="en-US" sz="800" dirty="0"/>
-          </a:p>
-          <a:p>
             <a:pPr defTabSz="882670">
               <a:defRPr/>
             </a:pPr>
@@ -3756,6 +3742,227 @@
           <a:lstStyle/>
           <a:p>
             <a:r>
+              <a:rPr lang="en-US" dirty="0"/>
+              <a:t>I still wanted to show a small example where the combination with </a:t>
+            </a:r>
+            <a:r>
+              <a:rPr lang="en-US" dirty="0" err="1"/>
+              <a:t>IConfiguration</a:t>
+            </a:r>
+            <a:r>
+              <a:rPr lang="en-US" dirty="0"/>
+              <a:t>, </a:t>
+            </a:r>
+            <a:r>
+              <a:rPr lang="en-US" dirty="0" err="1"/>
+              <a:t>IOptions</a:t>
+            </a:r>
+            <a:r>
+              <a:rPr lang="en-US" dirty="0"/>
+              <a:t> and Dependency Injection is doing some magic when it gets combined.</a:t>
+            </a:r>
+          </a:p>
+          <a:p>
+            <a:endParaRPr lang="en-US" dirty="0"/>
+          </a:p>
+          <a:p>
+            <a:r>
+              <a:rPr lang="en-US" dirty="0"/>
+              <a:t>The example simulates a third-party client which we need to use. The only way we can use it is by using a factory with some settings, they were even so nice of providing an example on how you should use it</a:t>
+            </a:r>
+          </a:p>
+          <a:p>
+            <a:r>
+              <a:rPr lang="en-US" dirty="0"/>
+              <a:t>However, if I would need the interface for example not in my startup project without using DI it would become messy, especially as the third-party also gave a strong suggestion of using their client as a singleton.</a:t>
+            </a:r>
+          </a:p>
+          <a:p>
+            <a:r>
+              <a:rPr lang="en-US" dirty="0"/>
+              <a:t>Although the code works, it feels like a sacrifice in the current example state.</a:t>
+            </a:r>
+          </a:p>
+          <a:p>
+            <a:endParaRPr lang="en-US" dirty="0"/>
+          </a:p>
+          <a:p>
+            <a:r>
+              <a:rPr lang="en-US"/>
+              <a:t>To </a:t>
+            </a:r>
+            <a:r>
+              <a:rPr lang="en-US" dirty="0"/>
+              <a:t>address it we would need to create a simple options class which we then can bind.</a:t>
+            </a:r>
+          </a:p>
+          <a:p>
+            <a:r>
+              <a:rPr lang="en-US" dirty="0"/>
+              <a:t>Once this is created, we can consume it using an </a:t>
+            </a:r>
+            <a:r>
+              <a:rPr lang="en-US" dirty="0" err="1"/>
+              <a:t>AddSingletion</a:t>
+            </a:r>
+            <a:r>
+              <a:rPr lang="en-US" dirty="0"/>
+              <a:t> method with the </a:t>
+            </a:r>
+            <a:r>
+              <a:rPr lang="en-US" dirty="0" err="1"/>
+              <a:t>serviceprovider</a:t>
+            </a:r>
+            <a:r>
+              <a:rPr lang="en-US" dirty="0"/>
+              <a:t>.</a:t>
+            </a:r>
+          </a:p>
+          <a:p>
+            <a:r>
+              <a:rPr lang="en-US" dirty="0"/>
+              <a:t>Inside this method we can then create client via the factory and consume the options.</a:t>
+            </a:r>
+          </a:p>
+          <a:p>
+            <a:r>
+              <a:rPr lang="en-US" dirty="0"/>
+              <a:t>The advantage of this little detour, is that we now can request the </a:t>
+            </a:r>
+            <a:r>
+              <a:rPr lang="en-US" dirty="0" err="1"/>
+              <a:t>INonDiClient</a:t>
+            </a:r>
+            <a:r>
+              <a:rPr lang="en-US" dirty="0"/>
+              <a:t> from the DI container, and by doing so it allows us to consume it wherever this interface should be known inside the project. The configuration can be loaded from any </a:t>
+            </a:r>
+            <a:r>
+              <a:rPr lang="en-US" dirty="0" err="1"/>
+              <a:t>serviceprovider</a:t>
+            </a:r>
+            <a:r>
+              <a:rPr lang="en-US" dirty="0"/>
+              <a:t> only at the time when needed.</a:t>
+            </a:r>
+          </a:p>
+          <a:p>
+            <a:endParaRPr lang="en-US" dirty="0"/>
+          </a:p>
+          <a:p>
+            <a:endParaRPr lang="en-US" dirty="0"/>
+          </a:p>
+          <a:p>
+            <a:endParaRPr lang="en-US" dirty="0"/>
+          </a:p>
+        </p:txBody>
+      </p:sp>
+      <p:sp>
+        <p:nvSpPr>
+          <p:cNvPr id="4" name="Slide Number Placeholder 3"/>
+          <p:cNvSpPr>
+            <a:spLocks noGrp="1"/>
+          </p:cNvSpPr>
+          <p:nvPr>
+            <p:ph type="sldNum" sz="quarter" idx="5"/>
+          </p:nvPr>
+        </p:nvSpPr>
+        <p:spPr>
+          <a:xfrm>
+            <a:off x="3884614" y="9597289"/>
+            <a:ext cx="2971800" cy="272125"/>
+          </a:xfrm>
+          <a:prstGeom prst="rect">
+            <a:avLst/>
+          </a:prstGeom>
+        </p:spPr>
+        <p:txBody>
+          <a:bodyPr/>
+          <a:lstStyle/>
+          <a:p>
+            <a:fld id="{D61B4C21-2AF8-4513-9A88-12DEBB551087}" type="slidenum">
+              <a:rPr lang="de-DE" smtClean="0"/>
+              <a:pPr/>
+              <a:t>21</a:t>
+            </a:fld>
+            <a:endParaRPr lang="de-DE" dirty="0"/>
+          </a:p>
+        </p:txBody>
+      </p:sp>
+    </p:spTree>
+    <p:extLst>
+      <p:ext uri="{BB962C8B-B14F-4D97-AF65-F5344CB8AC3E}">
+        <p14:creationId xmlns:p14="http://schemas.microsoft.com/office/powerpoint/2010/main" val="1714846204"/>
+      </p:ext>
+    </p:extLst>
+  </p:cSld>
+  <p:clrMapOvr>
+    <a:masterClrMapping/>
+  </p:clrMapOvr>
+</p:notes>
+</file>
+
+<file path=ppt/notesSlides/notesSlide22.xml><?xml version="1.0" encoding="utf-8"?>
+<p:notes xmlns:a="http://schemas.openxmlformats.org/drawingml/2006/main" xmlns:r="http://schemas.openxmlformats.org/officeDocument/2006/relationships" xmlns:p="http://schemas.openxmlformats.org/presentationml/2006/main">
+  <p:cSld>
+    <p:spTree>
+      <p:nvGrpSpPr>
+        <p:cNvPr id="1" name=""/>
+        <p:cNvGrpSpPr/>
+        <p:nvPr/>
+      </p:nvGrpSpPr>
+      <p:grpSpPr>
+        <a:xfrm>
+          <a:off x="0" y="0"/>
+          <a:ext cx="0" cy="0"/>
+          <a:chOff x="0" y="0"/>
+          <a:chExt cx="0" cy="0"/>
+        </a:xfrm>
+      </p:grpSpPr>
+      <p:sp>
+        <p:nvSpPr>
+          <p:cNvPr id="2" name="Slide Image Placeholder 1"/>
+          <p:cNvSpPr>
+            <a:spLocks noGrp="1" noRot="1" noChangeAspect="1"/>
+          </p:cNvSpPr>
+          <p:nvPr>
+            <p:ph type="sldImg"/>
+          </p:nvPr>
+        </p:nvSpPr>
+        <p:spPr>
+          <a:xfrm>
+            <a:off x="115888" y="388938"/>
+            <a:ext cx="6608762" cy="3717925"/>
+          </a:xfrm>
+          <a:prstGeom prst="rect">
+            <a:avLst/>
+          </a:prstGeom>
+        </p:spPr>
+      </p:sp>
+      <p:sp>
+        <p:nvSpPr>
+          <p:cNvPr id="3" name="Notes Placeholder 2"/>
+          <p:cNvSpPr>
+            <a:spLocks noGrp="1"/>
+          </p:cNvSpPr>
+          <p:nvPr>
+            <p:ph type="body" idx="1"/>
+          </p:nvPr>
+        </p:nvSpPr>
+        <p:spPr>
+          <a:xfrm>
+            <a:off x="360001" y="4276251"/>
+            <a:ext cx="6120000" cy="5248125"/>
+          </a:xfrm>
+          <a:prstGeom prst="rect">
+            <a:avLst/>
+          </a:prstGeom>
+        </p:spPr>
+        <p:txBody>
+          <a:bodyPr/>
+          <a:lstStyle/>
+          <a:p>
+            <a:r>
               <a:rPr lang="en-US" b="0" i="0" dirty="0">
                 <a:solidFill>
                   <a:srgbClr val="242424"/>
@@ -3807,7 +4014,7 @@
             <a:fld id="{D61B4C21-2AF8-4513-9A88-12DEBB551087}" type="slidenum">
               <a:rPr lang="de-DE" smtClean="0"/>
               <a:pPr/>
-              <a:t>21</a:t>
+              <a:t>22</a:t>
             </a:fld>
             <a:endParaRPr lang="de-DE" dirty="0"/>
           </a:p>
@@ -3897,16 +4104,6 @@
               <a:buChar char="•"/>
             </a:pPr>
             <a:r>
-              <a:rPr lang="en-US" dirty="0"/>
-              <a:t>DI Containers</a:t>
-            </a:r>
-          </a:p>
-          <a:p>
-            <a:pPr marL="275834" indent="-275834">
-              <a:buFont typeface="Arial" panose="020B0604020202020204" pitchFamily="34" charset="0"/>
-              <a:buChar char="•"/>
-            </a:pPr>
-            <a:r>
               <a:rPr lang="en-US" dirty="0" err="1"/>
               <a:t>IConfiguration</a:t>
             </a:r>
@@ -4608,6 +4805,31 @@
             <a:r>
               <a:rPr lang="de-DE" dirty="0"/>
               <a:t>.</a:t>
+            </a:r>
+          </a:p>
+          <a:p>
+            <a:endParaRPr lang="de-DE" dirty="0"/>
+          </a:p>
+          <a:p>
+            <a:r>
+              <a:rPr lang="en-US" b="0" i="0" dirty="0">
+                <a:solidFill>
+                  <a:srgbClr val="242424"/>
+                </a:solidFill>
+                <a:effectLst/>
+                <a:latin typeface="Segoe UI" panose="020B0502040204020203" pitchFamily="34" charset="0"/>
+              </a:rPr>
+              <a:t>In short, we needed to perform a specific action on an option value. Initially, it was proposed to copy and paste this action. </a:t>
+            </a:r>
+            <a:r>
+              <a:rPr lang="en-US" b="0" i="0">
+                <a:solidFill>
+                  <a:srgbClr val="242424"/>
+                </a:solidFill>
+                <a:effectLst/>
+                <a:latin typeface="Segoe UI" panose="020B0502040204020203" pitchFamily="34" charset="0"/>
+              </a:rPr>
+              <a:t>Although this approach would have worked, I didn't like the idea of having duplicated code.</a:t>
             </a:r>
           </a:p>
           <a:p>
@@ -17006,10 +17228,10 @@
       </p:grpSpPr>
       <p:sp>
         <p:nvSpPr>
-          <p:cNvPr id="6" name="Title 5">
+          <p:cNvPr id="2" name="Title 1">
             <a:extLst>
               <a:ext uri="{FF2B5EF4-FFF2-40B4-BE49-F238E27FC236}">
-                <a16:creationId xmlns:a16="http://schemas.microsoft.com/office/drawing/2014/main" id="{5E4EE174-04A0-F71B-9BE9-2D09BDBB3973}"/>
+                <a16:creationId xmlns:a16="http://schemas.microsoft.com/office/drawing/2014/main" id="{47FB5714-DB64-E571-5C47-76CAD8E954BC}"/>
               </a:ext>
             </a:extLst>
           </p:cNvPr>
@@ -17027,17 +17249,18 @@
           <a:p>
             <a:r>
               <a:rPr lang="nl-BE" dirty="0"/>
-              <a:t>Q&amp;A</a:t>
-            </a:r>
+              <a:t>Examples</a:t>
+            </a:r>
+            <a:endParaRPr lang="en-US" dirty="0"/>
           </a:p>
         </p:txBody>
       </p:sp>
       <p:pic>
         <p:nvPicPr>
-          <p:cNvPr id="11" name="Content Placeholder 10" descr="A qr code on a white background&#10;&#10;Description automatically generated">
+          <p:cNvPr id="7" name="Content Placeholder 6" descr="A hand writing on a blue board&#10;&#10;Description automatically generated">
             <a:extLst>
               <a:ext uri="{FF2B5EF4-FFF2-40B4-BE49-F238E27FC236}">
-                <a16:creationId xmlns:a16="http://schemas.microsoft.com/office/drawing/2014/main" id="{F50A4979-65CD-8ED3-0A1E-94665F9AB7D4}"/>
+                <a16:creationId xmlns:a16="http://schemas.microsoft.com/office/drawing/2014/main" id="{91EC149C-B91E-47E6-9971-6DA0F2F47D52}"/>
               </a:ext>
             </a:extLst>
           </p:cNvPr>
@@ -17045,7 +17268,7 @@
             <a:picLocks noGrp="1" noChangeAspect="1"/>
           </p:cNvPicPr>
           <p:nvPr>
-            <p:ph idx="13"/>
+            <p:ph idx="1"/>
           </p:nvPr>
         </p:nvPicPr>
         <p:blipFill>
@@ -17062,6 +17285,153 @@
         </p:blipFill>
         <p:spPr>
           <a:xfrm>
+            <a:off x="792162" y="971550"/>
+            <a:ext cx="7559676" cy="3779838"/>
+          </a:xfrm>
+        </p:spPr>
+      </p:pic>
+      <p:sp>
+        <p:nvSpPr>
+          <p:cNvPr id="4" name="Footer Placeholder 3">
+            <a:extLst>
+              <a:ext uri="{FF2B5EF4-FFF2-40B4-BE49-F238E27FC236}">
+                <a16:creationId xmlns:a16="http://schemas.microsoft.com/office/drawing/2014/main" id="{7777AB3F-2C62-266F-8D7B-0BD18B6D3475}"/>
+              </a:ext>
+            </a:extLst>
+          </p:cNvPr>
+          <p:cNvSpPr>
+            <a:spLocks noGrp="1"/>
+          </p:cNvSpPr>
+          <p:nvPr>
+            <p:ph type="ftr" sz="quarter" idx="11"/>
+          </p:nvPr>
+        </p:nvSpPr>
+        <p:spPr/>
+        <p:txBody>
+          <a:bodyPr/>
+          <a:lstStyle/>
+          <a:p>
+            <a:endParaRPr lang="de-DE" dirty="0"/>
+          </a:p>
+        </p:txBody>
+      </p:sp>
+      <p:sp>
+        <p:nvSpPr>
+          <p:cNvPr id="5" name="Slide Number Placeholder 4">
+            <a:extLst>
+              <a:ext uri="{FF2B5EF4-FFF2-40B4-BE49-F238E27FC236}">
+                <a16:creationId xmlns:a16="http://schemas.microsoft.com/office/drawing/2014/main" id="{301D380F-53E5-8CFA-9D71-5B1B5B7168C9}"/>
+              </a:ext>
+            </a:extLst>
+          </p:cNvPr>
+          <p:cNvSpPr>
+            <a:spLocks noGrp="1"/>
+          </p:cNvSpPr>
+          <p:nvPr>
+            <p:ph type="sldNum" sz="quarter" idx="12"/>
+          </p:nvPr>
+        </p:nvSpPr>
+        <p:spPr/>
+        <p:txBody>
+          <a:bodyPr/>
+          <a:lstStyle/>
+          <a:p>
+            <a:fld id="{AE839375-43AA-4A5D-B991-4343C4570BCB}" type="slidenum">
+              <a:rPr lang="de-DE" smtClean="0"/>
+              <a:t>21</a:t>
+            </a:fld>
+            <a:endParaRPr lang="de-DE"/>
+          </a:p>
+        </p:txBody>
+      </p:sp>
+    </p:spTree>
+    <p:extLst>
+      <p:ext uri="{BB962C8B-B14F-4D97-AF65-F5344CB8AC3E}">
+        <p14:creationId xmlns:p14="http://schemas.microsoft.com/office/powerpoint/2010/main" val="2341458334"/>
+      </p:ext>
+    </p:extLst>
+  </p:cSld>
+  <p:clrMapOvr>
+    <a:masterClrMapping/>
+  </p:clrMapOvr>
+</p:sld>
+</file>
+
+<file path=ppt/slides/slide22.xml><?xml version="1.0" encoding="utf-8"?>
+<p:sld xmlns:a="http://schemas.openxmlformats.org/drawingml/2006/main" xmlns:r="http://schemas.openxmlformats.org/officeDocument/2006/relationships" xmlns:p="http://schemas.openxmlformats.org/presentationml/2006/main">
+  <p:cSld>
+    <p:spTree>
+      <p:nvGrpSpPr>
+        <p:cNvPr id="1" name=""/>
+        <p:cNvGrpSpPr/>
+        <p:nvPr/>
+      </p:nvGrpSpPr>
+      <p:grpSpPr>
+        <a:xfrm>
+          <a:off x="0" y="0"/>
+          <a:ext cx="0" cy="0"/>
+          <a:chOff x="0" y="0"/>
+          <a:chExt cx="0" cy="0"/>
+        </a:xfrm>
+      </p:grpSpPr>
+      <p:sp>
+        <p:nvSpPr>
+          <p:cNvPr id="6" name="Title 5">
+            <a:extLst>
+              <a:ext uri="{FF2B5EF4-FFF2-40B4-BE49-F238E27FC236}">
+                <a16:creationId xmlns:a16="http://schemas.microsoft.com/office/drawing/2014/main" id="{5E4EE174-04A0-F71B-9BE9-2D09BDBB3973}"/>
+              </a:ext>
+            </a:extLst>
+          </p:cNvPr>
+          <p:cNvSpPr>
+            <a:spLocks noGrp="1"/>
+          </p:cNvSpPr>
+          <p:nvPr>
+            <p:ph type="title"/>
+          </p:nvPr>
+        </p:nvSpPr>
+        <p:spPr/>
+        <p:txBody>
+          <a:bodyPr/>
+          <a:lstStyle/>
+          <a:p>
+            <a:r>
+              <a:rPr lang="nl-BE" dirty="0"/>
+              <a:t>Q&amp;A</a:t>
+            </a:r>
+          </a:p>
+        </p:txBody>
+      </p:sp>
+      <p:pic>
+        <p:nvPicPr>
+          <p:cNvPr id="11" name="Content Placeholder 10" descr="A qr code on a white background&#10;&#10;Description automatically generated">
+            <a:extLst>
+              <a:ext uri="{FF2B5EF4-FFF2-40B4-BE49-F238E27FC236}">
+                <a16:creationId xmlns:a16="http://schemas.microsoft.com/office/drawing/2014/main" id="{F50A4979-65CD-8ED3-0A1E-94665F9AB7D4}"/>
+              </a:ext>
+            </a:extLst>
+          </p:cNvPr>
+          <p:cNvPicPr>
+            <a:picLocks noGrp="1" noChangeAspect="1"/>
+          </p:cNvPicPr>
+          <p:nvPr>
+            <p:ph idx="13"/>
+          </p:nvPr>
+        </p:nvPicPr>
+        <p:blipFill>
+          <a:blip r:embed="rId3">
+            <a:extLst>
+              <a:ext uri="{28A0092B-C50C-407E-A947-70E740481C1C}">
+                <a14:useLocalDpi xmlns:a14="http://schemas.microsoft.com/office/drawing/2010/main" val="0"/>
+              </a:ext>
+            </a:extLst>
+          </a:blip>
+          <a:stretch>
+            <a:fillRect/>
+          </a:stretch>
+        </p:blipFill>
+        <p:spPr>
+          <a:xfrm>
             <a:off x="4721902" y="861102"/>
             <a:ext cx="4062463" cy="4062463"/>
           </a:xfrm>
@@ -17115,7 +17485,7 @@
           <a:p>
             <a:fld id="{AE839375-43AA-4A5D-B991-4343C4570BCB}" type="slidenum">
               <a:rPr lang="de-DE" smtClean="0"/>
-              <a:t>21</a:t>
+              <a:t>22</a:t>
             </a:fld>
             <a:endParaRPr lang="de-DE"/>
           </a:p>

</xml_diff>

<commit_message>
Final slide & presentation update
</commit_message>
<xml_diff>
--- a/slides/presentation.pptx
+++ b/slides/presentation.pptx
@@ -278,7 +278,7 @@
           <a:p>
             <a:fld id="{37581487-DED7-4908-9A01-0A45EDCB1D6C}" type="datetimeFigureOut">
               <a:rPr lang="de-DE" sz="1100"/>
-              <a:t>14.05.2025</a:t>
+              <a:t>16.05.2025</a:t>
             </a:fld>
             <a:endParaRPr lang="de-DE" sz="1100"/>
           </a:p>
@@ -20827,15 +20827,6 @@
 </file>
 
 <file path=customXml/item1.xml><?xml version="1.0" encoding="utf-8"?>
-<?mso-contentType ?>
-<FormTemplates xmlns="http://schemas.microsoft.com/sharepoint/v3/contenttype/forms">
-  <Display>DocumentLibraryForm</Display>
-  <Edit>DocumentLibraryForm</Edit>
-  <New>DocumentLibraryForm</New>
-</FormTemplates>
-</file>
-
-<file path=customXml/item2.xml><?xml version="1.0" encoding="utf-8"?>
 <ct:contentTypeSchema xmlns:ct="http://schemas.microsoft.com/office/2006/metadata/contentType" xmlns:ma="http://schemas.microsoft.com/office/2006/metadata/properties/metaAttributes" ct:_="" ma:_="" ma:contentTypeName="Dokument" ma:contentTypeID="0x01010050460AE39A82AD4795A3565F3DAE5EA8" ma:contentTypeVersion="16" ma:contentTypeDescription="Ein neues Dokument erstellen." ma:contentTypeScope="" ma:versionID="ec82a9993c9b8a2201503eb30937bf4a">
   <xsd:schema xmlns:xsd="http://www.w3.org/2001/XMLSchema" xmlns:xs="http://www.w3.org/2001/XMLSchema" xmlns:p="http://schemas.microsoft.com/office/2006/metadata/properties" xmlns:ns2="e05445a8-2551-4a63-879e-01155c2c761e" xmlns:ns3="01e95462-78a7-41d4-9a93-e8d8dde53743" targetNamespace="http://schemas.microsoft.com/office/2006/metadata/properties" ma:root="true" ma:fieldsID="0382105114aa7af2a0cdb49a7fd70252" ns2:_="" ns3:_="">
     <xsd:import namespace="e05445a8-2551-4a63-879e-01155c2c761e"/>
@@ -21078,15 +21069,16 @@
 </ct:contentTypeSchema>
 </file>
 
-<file path=customXml/itemProps1.xml><?xml version="1.0" encoding="utf-8"?>
-<ds:datastoreItem xmlns:ds="http://schemas.openxmlformats.org/officeDocument/2006/customXml" ds:itemID="{DDA0BA8E-434D-48CF-8C42-C96ADE6F01B2}">
-  <ds:schemaRefs>
-    <ds:schemaRef ds:uri="http://schemas.microsoft.com/sharepoint/v3/contenttype/forms"/>
-  </ds:schemaRefs>
-</ds:datastoreItem>
+<file path=customXml/item2.xml><?xml version="1.0" encoding="utf-8"?>
+<?mso-contentType ?>
+<FormTemplates xmlns="http://schemas.microsoft.com/sharepoint/v3/contenttype/forms">
+  <Display>DocumentLibraryForm</Display>
+  <Edit>DocumentLibraryForm</Edit>
+  <New>DocumentLibraryForm</New>
+</FormTemplates>
 </file>
 
-<file path=customXml/itemProps2.xml><?xml version="1.0" encoding="utf-8"?>
+<file path=customXml/itemProps1.xml><?xml version="1.0" encoding="utf-8"?>
 <ds:datastoreItem xmlns:ds="http://schemas.openxmlformats.org/officeDocument/2006/customXml" ds:itemID="{0BB5088A-3ACC-49D2-A58D-F09F6B8954CE}">
   <ds:schemaRefs>
     <ds:schemaRef ds:uri="http://schemas.microsoft.com/office/2006/metadata/contentType"/>
@@ -21103,4 +21095,12 @@
     <ds:schemaRef ds:uri="http://schemas.microsoft.com/internal/obd"/>
   </ds:schemaRefs>
 </ds:datastoreItem>
+</file>
+
+<file path=customXml/itemProps2.xml><?xml version="1.0" encoding="utf-8"?>
+<ds:datastoreItem xmlns:ds="http://schemas.openxmlformats.org/officeDocument/2006/customXml" ds:itemID="{DDA0BA8E-434D-48CF-8C42-C96ADE6F01B2}">
+  <ds:schemaRefs>
+    <ds:schemaRef ds:uri="http://schemas.microsoft.com/sharepoint/v3/contenttype/forms"/>
+  </ds:schemaRefs>
+</ds:datastoreItem>
 </file>
</xml_diff>